<commit_message>
update inference kernel slides.
</commit_message>
<xml_diff>
--- a/Inference/Kernel/05.qnnpack.pptx
+++ b/Inference/Kernel/05.qnnpack.pptx
@@ -573,7 +573,7 @@
             <a:fld id="{C45443A1-D8F2-48CD-A659-3CEDBA8DF541}" type="datetimeFigureOut">
               <a:rPr lang="zh-CN" altLang="en-US" smtClean="0"/>
               <a:pPr/>
-              <a:t>2023/2/9</a:t>
+              <a:t>2023/3/2</a:t>
             </a:fld>
             <a:endParaRPr lang="zh-CN" altLang="en-US"/>
           </a:p>
@@ -38836,8 +38836,8 @@
           </a:p>
         </p:txBody>
       </p:sp>
-      <mc:AlternateContent xmlns:mc="http://schemas.openxmlformats.org/markup-compatibility/2006">
-        <mc:Choice xmlns:a14="http://schemas.microsoft.com/office/drawing/2010/main" Requires="a14">
+      <mc:AlternateContent xmlns:mc="http://schemas.openxmlformats.org/markup-compatibility/2006" xmlns:a14="http://schemas.microsoft.com/office/drawing/2010/main">
+        <mc:Choice Requires="a14">
           <p:sp>
             <p:nvSpPr>
               <p:cNvPr id="5" name="内容占位符 4">
@@ -38929,7 +38929,7 @@
             </p:txBody>
           </p:sp>
         </mc:Choice>
-        <mc:Fallback>
+        <mc:Fallback xmlns="">
           <p:sp>
             <p:nvSpPr>
               <p:cNvPr id="5" name="内容占位符 4">
@@ -38984,10 +38984,10 @@
           <p:nvPr/>
         </p:nvPicPr>
         <p:blipFill>
-          <a:blip r:embed="rId3">
+          <a:blip r:embed="rId3" cstate="screen">
             <a:extLst>
               <a:ext uri="{28A0092B-C50C-407E-A947-70E740481C1C}">
-                <a14:useLocalDpi xmlns:a14="http://schemas.microsoft.com/office/drawing/2010/main" val="0"/>
+                <a14:useLocalDpi xmlns:a14="http://schemas.microsoft.com/office/drawing/2010/main"/>
               </a:ext>
             </a:extLst>
           </a:blip>
@@ -39062,10 +39062,10 @@
           <p:nvPr/>
         </p:nvPicPr>
         <p:blipFill>
-          <a:blip r:embed="rId2">
+          <a:blip r:embed="rId2" cstate="screen">
             <a:extLst>
               <a:ext uri="{28A0092B-C50C-407E-A947-70E740481C1C}">
-                <a14:useLocalDpi xmlns:a14="http://schemas.microsoft.com/office/drawing/2010/main" val="0"/>
+                <a14:useLocalDpi xmlns:a14="http://schemas.microsoft.com/office/drawing/2010/main"/>
               </a:ext>
             </a:extLst>
           </a:blip>
@@ -39115,8 +39115,8 @@
           </a:p>
         </p:txBody>
       </p:sp>
-      <mc:AlternateContent xmlns:mc="http://schemas.openxmlformats.org/markup-compatibility/2006">
-        <mc:Choice xmlns:a14="http://schemas.microsoft.com/office/drawing/2010/main" Requires="a14">
+      <mc:AlternateContent xmlns:mc="http://schemas.openxmlformats.org/markup-compatibility/2006" xmlns:a14="http://schemas.microsoft.com/office/drawing/2010/main">
+        <mc:Choice Requires="a14">
           <p:sp>
             <p:nvSpPr>
               <p:cNvPr id="6" name="内容占位符 5">
@@ -39265,7 +39265,7 @@
             </p:txBody>
           </p:sp>
         </mc:Choice>
-        <mc:Fallback>
+        <mc:Fallback xmlns="">
           <p:sp>
             <p:nvSpPr>
               <p:cNvPr id="6" name="内容占位符 5">
@@ -39795,7 +39795,7 @@
           <a:blip r:embed="rId2">
             <a:extLst>
               <a:ext uri="{28A0092B-C50C-407E-A947-70E740481C1C}">
-                <a14:useLocalDpi xmlns:a14="http://schemas.microsoft.com/office/drawing/2010/main" val="0"/>
+                <a14:useLocalDpi xmlns:a14="http://schemas.microsoft.com/office/drawing/2010/main"/>
               </a:ext>
             </a:extLst>
           </a:blip>
@@ -40023,7 +40023,7 @@
           <a:blip r:embed="rId2">
             <a:extLst>
               <a:ext uri="{28A0092B-C50C-407E-A947-70E740481C1C}">
-                <a14:useLocalDpi xmlns:a14="http://schemas.microsoft.com/office/drawing/2010/main" val="0"/>
+                <a14:useLocalDpi xmlns:a14="http://schemas.microsoft.com/office/drawing/2010/main"/>
               </a:ext>
             </a:extLst>
           </a:blip>
@@ -40115,8 +40115,8 @@
           </a:p>
         </p:txBody>
       </p:sp>
-      <mc:AlternateContent xmlns:mc="http://schemas.openxmlformats.org/markup-compatibility/2006">
-        <mc:Choice xmlns:a14="http://schemas.microsoft.com/office/drawing/2010/main" Requires="a14">
+      <mc:AlternateContent xmlns:mc="http://schemas.openxmlformats.org/markup-compatibility/2006" xmlns:a14="http://schemas.microsoft.com/office/drawing/2010/main">
+        <mc:Choice Requires="a14">
           <p:sp>
             <p:nvSpPr>
               <p:cNvPr id="6" name="内容占位符 5">
@@ -40320,7 +40320,7 @@
             </p:txBody>
           </p:sp>
         </mc:Choice>
-        <mc:Fallback>
+        <mc:Fallback xmlns="">
           <p:sp>
             <p:nvSpPr>
               <p:cNvPr id="6" name="内容占位符 5">
@@ -40435,8 +40435,8 @@
           </a:p>
         </p:txBody>
       </p:sp>
-      <mc:AlternateContent xmlns:mc="http://schemas.openxmlformats.org/markup-compatibility/2006">
-        <mc:Choice xmlns:a14="http://schemas.microsoft.com/office/drawing/2010/main" Requires="a14">
+      <mc:AlternateContent xmlns:mc="http://schemas.openxmlformats.org/markup-compatibility/2006" xmlns:a14="http://schemas.microsoft.com/office/drawing/2010/main">
+        <mc:Choice Requires="a14">
           <p:sp>
             <p:nvSpPr>
               <p:cNvPr id="5" name="内容占位符 4">
@@ -40553,7 +40553,7 @@
             </p:txBody>
           </p:sp>
         </mc:Choice>
-        <mc:Fallback>
+        <mc:Fallback xmlns="">
           <p:sp>
             <p:nvSpPr>
               <p:cNvPr id="5" name="内容占位符 4">
@@ -40608,10 +40608,10 @@
           <p:nvPr/>
         </p:nvPicPr>
         <p:blipFill>
-          <a:blip r:embed="rId3">
+          <a:blip r:embed="rId3" cstate="screen">
             <a:extLst>
               <a:ext uri="{28A0092B-C50C-407E-A947-70E740481C1C}">
-                <a14:useLocalDpi xmlns:a14="http://schemas.microsoft.com/office/drawing/2010/main" val="0"/>
+                <a14:useLocalDpi xmlns:a14="http://schemas.microsoft.com/office/drawing/2010/main"/>
               </a:ext>
             </a:extLst>
           </a:blip>
@@ -40700,8 +40700,8 @@
           </a:p>
         </p:txBody>
       </p:sp>
-      <mc:AlternateContent xmlns:mc="http://schemas.openxmlformats.org/markup-compatibility/2006">
-        <mc:Choice xmlns:a14="http://schemas.microsoft.com/office/drawing/2010/main" Requires="a14">
+      <mc:AlternateContent xmlns:mc="http://schemas.openxmlformats.org/markup-compatibility/2006" xmlns:a14="http://schemas.microsoft.com/office/drawing/2010/main">
+        <mc:Choice Requires="a14">
           <p:sp>
             <p:nvSpPr>
               <p:cNvPr id="5" name="内容占位符 4">
@@ -40806,7 +40806,7 @@
             </p:txBody>
           </p:sp>
         </mc:Choice>
-        <mc:Fallback>
+        <mc:Fallback xmlns="">
           <p:sp>
             <p:nvSpPr>
               <p:cNvPr id="5" name="内容占位符 4">
@@ -40861,10 +40861,10 @@
           <p:nvPr/>
         </p:nvPicPr>
         <p:blipFill>
-          <a:blip r:embed="rId3">
+          <a:blip r:embed="rId3" cstate="screen">
             <a:extLst>
               <a:ext uri="{28A0092B-C50C-407E-A947-70E740481C1C}">
-                <a14:useLocalDpi xmlns:a14="http://schemas.microsoft.com/office/drawing/2010/main" val="0"/>
+                <a14:useLocalDpi xmlns:a14="http://schemas.microsoft.com/office/drawing/2010/main"/>
               </a:ext>
             </a:extLst>
           </a:blip>
@@ -40968,10 +40968,10 @@
           <p:nvPr/>
         </p:nvPicPr>
         <p:blipFill>
-          <a:blip r:embed="rId2">
+          <a:blip r:embed="rId2" cstate="screen">
             <a:extLst>
               <a:ext uri="{28A0092B-C50C-407E-A947-70E740481C1C}">
-                <a14:useLocalDpi xmlns:a14="http://schemas.microsoft.com/office/drawing/2010/main" val="0"/>
+                <a14:useLocalDpi xmlns:a14="http://schemas.microsoft.com/office/drawing/2010/main"/>
               </a:ext>
             </a:extLst>
           </a:blip>
@@ -45456,7 +45456,13 @@
           <p:nvPr/>
         </p:nvPicPr>
         <p:blipFill>
-          <a:blip r:embed="rId2"/>
+          <a:blip r:embed="rId2" cstate="screen">
+            <a:extLst>
+              <a:ext uri="{28A0092B-C50C-407E-A947-70E740481C1C}">
+                <a14:useLocalDpi xmlns:a14="http://schemas.microsoft.com/office/drawing/2010/main"/>
+              </a:ext>
+            </a:extLst>
+          </a:blip>
           <a:stretch>
             <a:fillRect/>
           </a:stretch>
@@ -45486,7 +45492,13 @@
           <p:nvPr/>
         </p:nvPicPr>
         <p:blipFill>
-          <a:blip r:embed="rId3"/>
+          <a:blip r:embed="rId3" cstate="screen">
+            <a:extLst>
+              <a:ext uri="{28A0092B-C50C-407E-A947-70E740481C1C}">
+                <a14:useLocalDpi xmlns:a14="http://schemas.microsoft.com/office/drawing/2010/main"/>
+              </a:ext>
+            </a:extLst>
+          </a:blip>
           <a:stretch>
             <a:fillRect/>
           </a:stretch>
@@ -45516,7 +45528,13 @@
           <p:nvPr/>
         </p:nvPicPr>
         <p:blipFill>
-          <a:blip r:embed="rId4"/>
+          <a:blip r:embed="rId4" cstate="screen">
+            <a:extLst>
+              <a:ext uri="{28A0092B-C50C-407E-A947-70E740481C1C}">
+                <a14:useLocalDpi xmlns:a14="http://schemas.microsoft.com/office/drawing/2010/main"/>
+              </a:ext>
+            </a:extLst>
+          </a:blip>
           <a:stretch>
             <a:fillRect/>
           </a:stretch>
@@ -45546,7 +45564,13 @@
           <p:nvPr/>
         </p:nvPicPr>
         <p:blipFill>
-          <a:blip r:embed="rId5"/>
+          <a:blip r:embed="rId5" cstate="screen">
+            <a:extLst>
+              <a:ext uri="{28A0092B-C50C-407E-A947-70E740481C1C}">
+                <a14:useLocalDpi xmlns:a14="http://schemas.microsoft.com/office/drawing/2010/main"/>
+              </a:ext>
+            </a:extLst>
+          </a:blip>
           <a:stretch>
             <a:fillRect/>
           </a:stretch>
@@ -45640,8 +45664,8 @@
           </a:p>
         </p:txBody>
       </p:sp>
-      <mc:AlternateContent xmlns:mc="http://schemas.openxmlformats.org/markup-compatibility/2006">
-        <mc:Choice xmlns:a14="http://schemas.microsoft.com/office/drawing/2010/main" Requires="a14">
+      <mc:AlternateContent xmlns:mc="http://schemas.openxmlformats.org/markup-compatibility/2006" xmlns:a14="http://schemas.microsoft.com/office/drawing/2010/main">
+        <mc:Choice Requires="a14">
           <p:sp>
             <p:nvSpPr>
               <p:cNvPr id="6" name="内容占位符 5">
@@ -45772,7 +45796,7 @@
             </p:txBody>
           </p:sp>
         </mc:Choice>
-        <mc:Fallback>
+        <mc:Fallback xmlns="">
           <p:sp>
             <p:nvSpPr>
               <p:cNvPr id="6" name="内容占位符 5">
@@ -45830,7 +45854,7 @@
           <a:blip r:embed="rId3">
             <a:extLst>
               <a:ext uri="{28A0092B-C50C-407E-A947-70E740481C1C}">
-                <a14:useLocalDpi xmlns:a14="http://schemas.microsoft.com/office/drawing/2010/main" val="0"/>
+                <a14:useLocalDpi xmlns:a14="http://schemas.microsoft.com/office/drawing/2010/main"/>
               </a:ext>
             </a:extLst>
           </a:blip>
@@ -45927,8 +45951,8 @@
           </a:p>
         </p:txBody>
       </p:sp>
-      <mc:AlternateContent xmlns:mc="http://schemas.openxmlformats.org/markup-compatibility/2006">
-        <mc:Choice xmlns:a14="http://schemas.microsoft.com/office/drawing/2010/main" Requires="a14">
+      <mc:AlternateContent xmlns:mc="http://schemas.openxmlformats.org/markup-compatibility/2006" xmlns:a14="http://schemas.microsoft.com/office/drawing/2010/main">
+        <mc:Choice Requires="a14">
           <p:sp>
             <p:nvSpPr>
               <p:cNvPr id="6" name="内容占位符 5">
@@ -46064,7 +46088,7 @@
             </p:txBody>
           </p:sp>
         </mc:Choice>
-        <mc:Fallback>
+        <mc:Fallback xmlns="">
           <p:sp>
             <p:nvSpPr>
               <p:cNvPr id="6" name="内容占位符 5">
@@ -46126,7 +46150,7 @@
           <a:blip r:embed="rId3">
             <a:extLst>
               <a:ext uri="{28A0092B-C50C-407E-A947-70E740481C1C}">
-                <a14:useLocalDpi xmlns:a14="http://schemas.microsoft.com/office/drawing/2010/main" val="0"/>
+                <a14:useLocalDpi xmlns:a14="http://schemas.microsoft.com/office/drawing/2010/main"/>
               </a:ext>
             </a:extLst>
           </a:blip>

</xml_diff>